<commit_message>
Added Fine Payment into ppt
</commit_message>
<xml_diff>
--- a/Week 9/Week 9 – Functional Design.pptx
+++ b/Week 9/Week 9 – Functional Design.pptx
@@ -5,10 +5,10 @@
     <p:sldMasterId id="2147483684" r:id="rId1"/>
   </p:sldMasterIdLst>
   <p:notesMasterIdLst>
-    <p:notesMasterId r:id="rId12"/>
+    <p:notesMasterId r:id="rId13"/>
   </p:notesMasterIdLst>
   <p:handoutMasterIdLst>
-    <p:handoutMasterId r:id="rId13"/>
+    <p:handoutMasterId r:id="rId14"/>
   </p:handoutMasterIdLst>
   <p:sldIdLst>
     <p:sldId id="280" r:id="rId2"/>
@@ -21,6 +21,7 @@
     <p:sldId id="275" r:id="rId9"/>
     <p:sldId id="276" r:id="rId10"/>
     <p:sldId id="277" r:id="rId11"/>
+    <p:sldId id="281" r:id="rId12"/>
   </p:sldIdLst>
   <p:sldSz cx="12192000" cy="6858000"/>
   <p:notesSz cx="6858000" cy="9144000"/>
@@ -223,7 +224,7 @@
           <a:p>
             <a:fld id="{E5CB2E47-6F41-409B-AD22-834AE1EFF186}" type="datetimeFigureOut">
               <a:rPr lang="en-US" smtClean="0"/>
-              <a:t>23-Jul-19</a:t>
+              <a:t>7/23/2019</a:t>
             </a:fld>
             <a:endParaRPr lang="en-US" dirty="0"/>
           </a:p>
@@ -388,7 +389,7 @@
           <a:p>
             <a:fld id="{FAD6744A-403D-42A1-BFE7-61DA46EE7C6C}" type="datetimeFigureOut">
               <a:rPr lang="en-US" smtClean="0"/>
-              <a:t>23-Jul-19</a:t>
+              <a:t>7/23/2019</a:t>
             </a:fld>
             <a:endParaRPr lang="en-US" dirty="0"/>
           </a:p>
@@ -1083,7 +1084,7 @@
           <a:p>
             <a:fld id="{349BF3EA-1A78-4F07-BDC0-C8A1BD461199}" type="datetimeFigureOut">
               <a:rPr lang="en-US" smtClean="0"/>
-              <a:t>23-Jul-19</a:t>
+              <a:t>7/23/2019</a:t>
             </a:fld>
             <a:endParaRPr lang="en-US" dirty="0"/>
           </a:p>
@@ -1267,7 +1268,7 @@
           <a:p>
             <a:fld id="{349BF3EA-1A78-4F07-BDC0-C8A1BD461199}" type="datetimeFigureOut">
               <a:rPr lang="en-US" smtClean="0"/>
-              <a:t>23-Jul-19</a:t>
+              <a:t>7/23/2019</a:t>
             </a:fld>
             <a:endParaRPr lang="en-US" dirty="0"/>
           </a:p>
@@ -1461,7 +1462,7 @@
           <a:p>
             <a:fld id="{349BF3EA-1A78-4F07-BDC0-C8A1BD461199}" type="datetimeFigureOut">
               <a:rPr lang="en-US" smtClean="0"/>
-              <a:t>23-Jul-19</a:t>
+              <a:t>7/23/2019</a:t>
             </a:fld>
             <a:endParaRPr lang="en-US" dirty="0"/>
           </a:p>
@@ -1650,7 +1651,7 @@
           <a:p>
             <a:fld id="{349BF3EA-1A78-4F07-BDC0-C8A1BD461199}" type="datetimeFigureOut">
               <a:rPr lang="en-US" smtClean="0"/>
-              <a:t>23-Jul-19</a:t>
+              <a:t>7/23/2019</a:t>
             </a:fld>
             <a:endParaRPr lang="en-US" dirty="0"/>
           </a:p>
@@ -2116,7 +2117,7 @@
           <a:p>
             <a:fld id="{349BF3EA-1A78-4F07-BDC0-C8A1BD461199}" type="datetimeFigureOut">
               <a:rPr lang="en-US" smtClean="0"/>
-              <a:t>23-Jul-19</a:t>
+              <a:t>7/23/2019</a:t>
             </a:fld>
             <a:endParaRPr lang="en-US" dirty="0"/>
           </a:p>
@@ -2362,7 +2363,7 @@
           <a:p>
             <a:fld id="{349BF3EA-1A78-4F07-BDC0-C8A1BD461199}" type="datetimeFigureOut">
               <a:rPr lang="en-US" smtClean="0"/>
-              <a:t>23-Jul-19</a:t>
+              <a:t>7/23/2019</a:t>
             </a:fld>
             <a:endParaRPr lang="en-US" dirty="0"/>
           </a:p>
@@ -2747,7 +2748,7 @@
           <a:p>
             <a:fld id="{349BF3EA-1A78-4F07-BDC0-C8A1BD461199}" type="datetimeFigureOut">
               <a:rPr lang="en-US" smtClean="0"/>
-              <a:t>23-Jul-19</a:t>
+              <a:t>7/23/2019</a:t>
             </a:fld>
             <a:endParaRPr lang="en-US" dirty="0"/>
           </a:p>
@@ -2879,7 +2880,7 @@
           <a:p>
             <a:fld id="{349BF3EA-1A78-4F07-BDC0-C8A1BD461199}" type="datetimeFigureOut">
               <a:rPr lang="en-US" smtClean="0"/>
-              <a:t>23-Jul-19</a:t>
+              <a:t>7/23/2019</a:t>
             </a:fld>
             <a:endParaRPr lang="en-US" dirty="0"/>
           </a:p>
@@ -2989,7 +2990,7 @@
           <a:p>
             <a:fld id="{349BF3EA-1A78-4F07-BDC0-C8A1BD461199}" type="datetimeFigureOut">
               <a:rPr lang="en-US" smtClean="0"/>
-              <a:t>23-Jul-19</a:t>
+              <a:t>7/23/2019</a:t>
             </a:fld>
             <a:endParaRPr lang="en-US" dirty="0"/>
           </a:p>
@@ -3333,7 +3334,7 @@
           <a:p>
             <a:fld id="{349BF3EA-1A78-4F07-BDC0-C8A1BD461199}" type="datetimeFigureOut">
               <a:rPr lang="en-US" smtClean="0"/>
-              <a:t>23-Jul-19</a:t>
+              <a:t>7/23/2019</a:t>
             </a:fld>
             <a:endParaRPr lang="en-US" dirty="0"/>
           </a:p>
@@ -3722,7 +3723,7 @@
           <a:p>
             <a:fld id="{349BF3EA-1A78-4F07-BDC0-C8A1BD461199}" type="datetimeFigureOut">
               <a:rPr lang="en-US" smtClean="0"/>
-              <a:t>23-Jul-19</a:t>
+              <a:t>7/23/2019</a:t>
             </a:fld>
             <a:endParaRPr lang="en-US" dirty="0"/>
           </a:p>
@@ -4084,7 +4085,7 @@
           <a:p>
             <a:fld id="{349BF3EA-1A78-4F07-BDC0-C8A1BD461199}" type="datetimeFigureOut">
               <a:rPr lang="en-US" smtClean="0"/>
-              <a:t>23-Jul-19</a:t>
+              <a:t>7/23/2019</a:t>
             </a:fld>
             <a:endParaRPr lang="en-US" dirty="0"/>
           </a:p>
@@ -4562,7 +4563,7 @@
           </a:xfrm>
         </p:spPr>
         <p:txBody>
-          <a:bodyPr>
+          <a:bodyPr vert="horz" anchor="t">
             <a:normAutofit fontScale="77500" lnSpcReduction="20000"/>
           </a:bodyPr>
           <a:lstStyle/>
@@ -4575,10 +4576,10 @@
           <a:p>
             <a:pPr lvl="1"/>
             <a:r>
-              <a:rPr lang="en-US" sz="2600" u="sng" dirty="0"/>
-              <a:t>3.1 Search Book</a:t>
-            </a:r>
-            <a:endParaRPr lang="en-US" sz="2200" dirty="0"/>
+              <a:rPr lang="en-US" sz="2600" u="sng"/>
+              <a:t>Search Book</a:t>
+            </a:r>
+            <a:endParaRPr lang="en-US" sz="2200"/>
           </a:p>
           <a:p>
             <a:pPr lvl="2"/>
@@ -4591,10 +4592,10 @@
           <a:p>
             <a:pPr lvl="1"/>
             <a:r>
-              <a:rPr lang="en-US" sz="2600" u="sng" dirty="0"/>
-              <a:t>3.2 Borrow Confirmation</a:t>
-            </a:r>
-            <a:endParaRPr lang="en-US" sz="2200" dirty="0"/>
+              <a:rPr lang="en-US" sz="2600" u="sng"/>
+              <a:t>Borrow Confirmation</a:t>
+            </a:r>
+            <a:endParaRPr lang="en-US" sz="2200"/>
           </a:p>
           <a:p>
             <a:pPr lvl="2"/>
@@ -4607,10 +4608,10 @@
           <a:p>
             <a:pPr lvl="1"/>
             <a:r>
-              <a:rPr lang="en-US" sz="2600" u="sng" dirty="0"/>
-              <a:t>3.3 Book Reservation</a:t>
-            </a:r>
-            <a:endParaRPr lang="en-US" sz="2200" dirty="0"/>
+              <a:rPr lang="en-US" sz="2600" u="sng"/>
+              <a:t>Book Reservation</a:t>
+            </a:r>
+            <a:endParaRPr lang="en-US" sz="2200"/>
           </a:p>
           <a:p>
             <a:pPr lvl="2"/>
@@ -4623,10 +4624,10 @@
           <a:p>
             <a:pPr lvl="1"/>
             <a:r>
-              <a:rPr lang="en-US" sz="2600" u="sng" dirty="0"/>
-              <a:t>3.4 Collect Book</a:t>
-            </a:r>
-            <a:endParaRPr lang="en-US" sz="2200" dirty="0"/>
+              <a:rPr lang="en-US" sz="2600" u="sng"/>
+              <a:t>Collect Book</a:t>
+            </a:r>
+            <a:endParaRPr lang="en-US" sz="2200"/>
           </a:p>
           <a:p>
             <a:pPr lvl="2"/>
@@ -4639,10 +4640,10 @@
           <a:p>
             <a:pPr lvl="1"/>
             <a:r>
-              <a:rPr lang="en-US" sz="2600" u="sng" dirty="0"/>
-              <a:t>3.5 Renew Book</a:t>
-            </a:r>
-            <a:endParaRPr lang="en-US" sz="2200" dirty="0"/>
+              <a:rPr lang="en-US" sz="2600" u="sng"/>
+              <a:t>Renew Book</a:t>
+            </a:r>
+            <a:endParaRPr lang="en-US" sz="2200"/>
           </a:p>
           <a:p>
             <a:pPr lvl="2"/>
@@ -4655,10 +4656,10 @@
           <a:p>
             <a:pPr lvl="1"/>
             <a:r>
-              <a:rPr lang="en-US" sz="2600" u="sng" dirty="0"/>
-              <a:t>3.6 Update Book Status</a:t>
-            </a:r>
-            <a:endParaRPr lang="en-US" sz="2200" dirty="0"/>
+              <a:rPr lang="en-US" sz="2600" u="sng"/>
+              <a:t>Update Book Status</a:t>
+            </a:r>
+            <a:endParaRPr lang="en-US" sz="2200"/>
           </a:p>
           <a:p>
             <a:pPr lvl="2"/>
@@ -4678,6 +4679,221 @@
     <p:extLst>
       <p:ext uri="{BB962C8B-B14F-4D97-AF65-F5344CB8AC3E}">
         <p14:creationId xmlns:p14="http://schemas.microsoft.com/office/powerpoint/2010/main" val="1980976995"/>
+      </p:ext>
+    </p:extLst>
+  </p:cSld>
+  <p:clrMapOvr>
+    <a:masterClrMapping/>
+  </p:clrMapOvr>
+  <mc:AlternateContent xmlns:mc="http://schemas.openxmlformats.org/markup-compatibility/2006" xmlns:p14="http://schemas.microsoft.com/office/powerpoint/2010/main">
+    <mc:Choice Requires="p14">
+      <p:transition spd="med" p14:dur="700">
+        <p:fade/>
+      </p:transition>
+    </mc:Choice>
+    <mc:Fallback xmlns="">
+      <p:transition spd="med">
+        <p:fade/>
+      </p:transition>
+    </mc:Fallback>
+  </mc:AlternateContent>
+</p:sld>
+</file>
+
+<file path=ppt/slides/slide11.xml><?xml version="1.0" encoding="utf-8"?>
+<p:sld xmlns:a="http://schemas.openxmlformats.org/drawingml/2006/main" xmlns:r="http://schemas.openxmlformats.org/officeDocument/2006/relationships" xmlns:p="http://schemas.openxmlformats.org/presentationml/2006/main">
+  <p:cSld>
+    <p:spTree>
+      <p:nvGrpSpPr>
+        <p:cNvPr id="1" name=""/>
+        <p:cNvGrpSpPr/>
+        <p:nvPr/>
+      </p:nvGrpSpPr>
+      <p:grpSpPr>
+        <a:xfrm>
+          <a:off x="0" y="0"/>
+          <a:ext cx="0" cy="0"/>
+          <a:chOff x="0" y="0"/>
+          <a:chExt cx="0" cy="0"/>
+        </a:xfrm>
+      </p:grpSpPr>
+      <p:sp>
+        <p:nvSpPr>
+          <p:cNvPr id="2" name="Title 1">
+            <a:extLst>
+              <a:ext uri="{FF2B5EF4-FFF2-40B4-BE49-F238E27FC236}">
+                <a16:creationId xmlns:a16="http://schemas.microsoft.com/office/drawing/2014/main" id="{B84E5134-4116-476E-84E5-B4BD830F7C4B}"/>
+              </a:ext>
+            </a:extLst>
+          </p:cNvPr>
+          <p:cNvSpPr>
+            <a:spLocks noGrp="1"/>
+          </p:cNvSpPr>
+          <p:nvPr>
+            <p:ph type="title"/>
+          </p:nvPr>
+        </p:nvSpPr>
+        <p:spPr/>
+        <p:txBody>
+          <a:bodyPr/>
+          <a:lstStyle/>
+          <a:p>
+            <a:r>
+              <a:rPr lang="en-GB" dirty="0"/>
+              <a:t>Functions and Features</a:t>
+            </a:r>
+          </a:p>
+        </p:txBody>
+      </p:sp>
+      <p:sp>
+        <p:nvSpPr>
+          <p:cNvPr id="3" name="Content Placeholder 2">
+            <a:extLst>
+              <a:ext uri="{FF2B5EF4-FFF2-40B4-BE49-F238E27FC236}">
+                <a16:creationId xmlns:a16="http://schemas.microsoft.com/office/drawing/2014/main" id="{A1049F0D-94C2-4667-8665-3208489C8559}"/>
+              </a:ext>
+            </a:extLst>
+          </p:cNvPr>
+          <p:cNvSpPr>
+            <a:spLocks noGrp="1"/>
+          </p:cNvSpPr>
+          <p:nvPr>
+            <p:ph sz="quarter" idx="1"/>
+          </p:nvPr>
+        </p:nvSpPr>
+        <p:spPr/>
+        <p:txBody>
+          <a:bodyPr vert="horz" anchor="t">
+            <a:normAutofit/>
+          </a:bodyPr>
+          <a:lstStyle/>
+          <a:p>
+            <a:r>
+              <a:rPr lang="en-US" dirty="0">
+                <a:ea typeface="+mn-lt"/>
+                <a:cs typeface="+mn-lt"/>
+              </a:rPr>
+              <a:t>Fine Payment</a:t>
+            </a:r>
+          </a:p>
+          <a:p>
+            <a:pPr lvl="1"/>
+            <a:r>
+              <a:rPr lang="en-US" u="sng" dirty="0">
+                <a:ea typeface="+mn-lt"/>
+                <a:cs typeface="+mn-lt"/>
+              </a:rPr>
+              <a:t>Receive Fine Details</a:t>
+            </a:r>
+            <a:endParaRPr lang="en-US" dirty="0">
+              <a:ea typeface="+mn-lt"/>
+              <a:cs typeface="+mn-lt"/>
+            </a:endParaRPr>
+          </a:p>
+          <a:p>
+            <a:pPr marL="594360" lvl="2" indent="0">
+              <a:buNone/>
+            </a:pPr>
+            <a:endParaRPr lang="en-US" dirty="0">
+              <a:ea typeface="+mn-lt"/>
+              <a:cs typeface="+mn-lt"/>
+            </a:endParaRPr>
+          </a:p>
+          <a:p>
+            <a:pPr lvl="1"/>
+            <a:r>
+              <a:rPr lang="en-US" u="sng">
+                <a:ea typeface="+mn-lt"/>
+                <a:cs typeface="+mn-lt"/>
+              </a:rPr>
+              <a:t>Calculate Fine</a:t>
+            </a:r>
+            <a:endParaRPr lang="en-US" dirty="0">
+              <a:ea typeface="+mn-lt"/>
+              <a:cs typeface="+mn-lt"/>
+            </a:endParaRPr>
+          </a:p>
+          <a:p>
+            <a:pPr lvl="1"/>
+            <a:endParaRPr lang="en-US" u="sng" dirty="0">
+              <a:ea typeface="+mn-lt"/>
+              <a:cs typeface="+mn-lt"/>
+            </a:endParaRPr>
+          </a:p>
+          <a:p>
+            <a:pPr lvl="1"/>
+            <a:r>
+              <a:rPr lang="en-US" u="sng">
+                <a:ea typeface="+mn-lt"/>
+                <a:cs typeface="+mn-lt"/>
+              </a:rPr>
+              <a:t>Payment Option</a:t>
+            </a:r>
+            <a:endParaRPr lang="en-US" dirty="0">
+              <a:ea typeface="+mn-lt"/>
+              <a:cs typeface="+mn-lt"/>
+            </a:endParaRPr>
+          </a:p>
+          <a:p>
+            <a:pPr lvl="1"/>
+            <a:endParaRPr lang="en-US" u="sng" dirty="0">
+              <a:ea typeface="+mn-lt"/>
+              <a:cs typeface="+mn-lt"/>
+            </a:endParaRPr>
+          </a:p>
+          <a:p>
+            <a:pPr lvl="1"/>
+            <a:r>
+              <a:rPr lang="en-US" u="sng">
+                <a:ea typeface="+mn-lt"/>
+                <a:cs typeface="+mn-lt"/>
+              </a:rPr>
+              <a:t>Online Banking</a:t>
+            </a:r>
+            <a:endParaRPr lang="en-US" u="sng" dirty="0">
+              <a:ea typeface="+mn-lt"/>
+              <a:cs typeface="+mn-lt"/>
+            </a:endParaRPr>
+          </a:p>
+          <a:p>
+            <a:pPr lvl="1"/>
+            <a:endParaRPr lang="en-US" u="sng" dirty="0">
+              <a:ea typeface="+mn-lt"/>
+              <a:cs typeface="+mn-lt"/>
+            </a:endParaRPr>
+          </a:p>
+          <a:p>
+            <a:pPr lvl="1"/>
+            <a:r>
+              <a:rPr lang="en-US" u="sng">
+                <a:ea typeface="+mn-lt"/>
+                <a:cs typeface="+mn-lt"/>
+              </a:rPr>
+              <a:t>Store Fines</a:t>
+            </a:r>
+            <a:endParaRPr lang="en-US" dirty="0">
+              <a:ea typeface="+mn-lt"/>
+              <a:cs typeface="+mn-lt"/>
+            </a:endParaRPr>
+          </a:p>
+          <a:p>
+            <a:pPr lvl="1"/>
+            <a:endParaRPr lang="en-US" dirty="0">
+              <a:ea typeface="+mn-lt"/>
+              <a:cs typeface="+mn-lt"/>
+            </a:endParaRPr>
+          </a:p>
+          <a:p>
+            <a:endParaRPr lang="en-GB" dirty="0">
+              <a:cs typeface="Calibri"/>
+            </a:endParaRPr>
+          </a:p>
+        </p:txBody>
+      </p:sp>
+    </p:spTree>
+    <p:extLst>
+      <p:ext uri="{BB962C8B-B14F-4D97-AF65-F5344CB8AC3E}">
+        <p14:creationId xmlns:p14="http://schemas.microsoft.com/office/powerpoint/2010/main" val="745007224"/>
       </p:ext>
     </p:extLst>
   </p:cSld>

</xml_diff>